<commit_message>
Updated slides and removed boats
</commit_message>
<xml_diff>
--- a/IntroToMultiThreading.pptx
+++ b/IntroToMultiThreading.pptx
@@ -19127,6 +19127,106 @@
           </a:p>
         </p:txBody>
       </p:sp>
+      <p:sp>
+        <p:nvSpPr>
+          <p:cNvPr id="2" name="Google Shape;61;p15">
+            <a:extLst>
+              <a:ext uri="{FF2B5EF4-FFF2-40B4-BE49-F238E27FC236}">
+                <a16:creationId xmlns:a16="http://schemas.microsoft.com/office/drawing/2014/main" id="{E45FE050-9C71-D827-4F17-A9761BFB3C17}"/>
+              </a:ext>
+            </a:extLst>
+          </p:cNvPr>
+          <p:cNvSpPr txBox="1"/>
+          <p:nvPr/>
+        </p:nvSpPr>
+        <p:spPr>
+          <a:xfrm>
+            <a:off x="225852" y="4025350"/>
+            <a:ext cx="7941402" cy="800189"/>
+          </a:xfrm>
+          <a:prstGeom prst="rect">
+            <a:avLst/>
+          </a:prstGeom>
+          <a:noFill/>
+          <a:ln>
+            <a:noFill/>
+          </a:ln>
+        </p:spPr>
+        <p:txBody>
+          <a:bodyPr spcFirstLastPara="1" wrap="square" lIns="91425" tIns="91425" rIns="91425" bIns="91425" anchor="t" anchorCtr="0">
+            <a:spAutoFit/>
+          </a:bodyPr>
+          <a:lstStyle/>
+          <a:p>
+            <a:pPr marL="0" lvl="0" indent="0" algn="l" rtl="0">
+              <a:spcBef>
+                <a:spcPts val="0"/>
+              </a:spcBef>
+              <a:spcAft>
+                <a:spcPts val="0"/>
+              </a:spcAft>
+              <a:buNone/>
+            </a:pPr>
+            <a:r>
+              <a:rPr lang="en-US" sz="2000" b="1" dirty="0">
+                <a:solidFill>
+                  <a:schemeClr val="bg1"/>
+                </a:solidFill>
+              </a:rPr>
+              <a:t>Demo Code and Slides:</a:t>
+            </a:r>
+          </a:p>
+          <a:p>
+            <a:pPr marL="0" lvl="0" indent="0" algn="l" rtl="0">
+              <a:spcBef>
+                <a:spcPts val="0"/>
+              </a:spcBef>
+              <a:spcAft>
+                <a:spcPts val="0"/>
+              </a:spcAft>
+              <a:buNone/>
+            </a:pPr>
+            <a:r>
+              <a:rPr lang="en-US" sz="2000" dirty="0">
+                <a:solidFill>
+                  <a:schemeClr val="bg1"/>
+                </a:solidFill>
+              </a:rPr>
+              <a:t>https://github.com/SamShue/Intro-to-MultiThreading</a:t>
+            </a:r>
+          </a:p>
+        </p:txBody>
+      </p:sp>
+      <p:pic>
+        <p:nvPicPr>
+          <p:cNvPr id="3" name="Picture 2">
+            <a:extLst>
+              <a:ext uri="{FF2B5EF4-FFF2-40B4-BE49-F238E27FC236}">
+                <a16:creationId xmlns:a16="http://schemas.microsoft.com/office/drawing/2014/main" id="{59A8E880-C0B9-A7EB-5800-CEBC29F7C44F}"/>
+              </a:ext>
+            </a:extLst>
+          </p:cNvPr>
+          <p:cNvPicPr>
+            <a:picLocks noChangeAspect="1"/>
+          </p:cNvPicPr>
+          <p:nvPr/>
+        </p:nvPicPr>
+        <p:blipFill>
+          <a:blip r:embed="rId4"/>
+          <a:stretch>
+            <a:fillRect/>
+          </a:stretch>
+        </p:blipFill>
+        <p:spPr>
+          <a:xfrm>
+            <a:off x="346919" y="3254374"/>
+            <a:ext cx="805381" cy="793283"/>
+          </a:xfrm>
+          <a:prstGeom prst="rect">
+            <a:avLst/>
+          </a:prstGeom>
+        </p:spPr>
+      </p:pic>
     </p:spTree>
   </p:cSld>
   <p:clrMapOvr>
@@ -22763,7 +22863,7 @@
         <p:spPr>
           <a:xfrm>
             <a:off x="904725" y="1129750"/>
-            <a:ext cx="7320900" cy="553968"/>
+            <a:ext cx="7941402" cy="923299"/>
           </a:xfrm>
           <a:prstGeom prst="rect">
             <a:avLst/>
@@ -22792,7 +22892,21 @@
               <a:rPr lang="en-US" sz="2400" b="1" dirty="0"/>
               <a:t>Demo Code and Slides:</a:t>
             </a:r>
-            <a:endParaRPr sz="3500" dirty="0"/>
+          </a:p>
+          <a:p>
+            <a:pPr marL="0" lvl="0" indent="0" algn="l" rtl="0">
+              <a:spcBef>
+                <a:spcPts val="0"/>
+              </a:spcBef>
+              <a:spcAft>
+                <a:spcPts val="0"/>
+              </a:spcAft>
+              <a:buNone/>
+            </a:pPr>
+            <a:r>
+              <a:rPr lang="en-US" sz="2400" dirty="0"/>
+              <a:t>https://github.com/SamShue/Intro-to-MultiThreading</a:t>
+            </a:r>
           </a:p>
         </p:txBody>
       </p:sp>
@@ -22818,8 +22932,8 @@
         </p:blipFill>
         <p:spPr>
           <a:xfrm>
-            <a:off x="2923865" y="1805638"/>
-            <a:ext cx="3121210" cy="3074324"/>
+            <a:off x="3339501" y="2359606"/>
+            <a:ext cx="2181535" cy="2148765"/>
           </a:xfrm>
           <a:prstGeom prst="rect">
             <a:avLst/>

</xml_diff>